<commit_message>
Add prompt on hw01.pptx
</commit_message>
<xml_diff>
--- a/hw01.pptx
+++ b/hw01.pptx
@@ -214,7 +214,7 @@
           <a:p>
             <a:fld id="{63F2F026-FB5B-4E26-A90C-1D599B641915}" type="datetimeFigureOut">
               <a:rPr lang="zh-TW" altLang="en-US" smtClean="0"/>
-              <a:t>2024/10/22</a:t>
+              <a:t>2024/10/23</a:t>
             </a:fld>
             <a:endParaRPr lang="zh-TW" altLang="en-US"/>
           </a:p>
@@ -526,6 +526,15 @@
           <a:lstStyle/>
           <a:p>
             <a:r>
+              <a:rPr lang="en-US" altLang="zh-TW" dirty="0"/>
+              <a:t>Prompt: A modern, minimalist interior scene with a large futuristic digital display on the wall. The display features abstract geometric shapes, circles, and thin lines, resembling a high-tech interface or data visualization. The room is sleek, with clean white walls and subtle vertical ridges on either side of the display. Two small white potted plants with delicate, minimalistic branches are placed symmetrically on both sides of the display. The setting has a calm, futuristic atmosphere with soft lighting that enhances the smooth textures and sharp lines, giving the space a clean, high-tech feel.</a:t>
+            </a:r>
+          </a:p>
+          <a:p>
+            <a:endParaRPr lang="en-US" altLang="zh-TW" dirty="0"/>
+          </a:p>
+          <a:p>
+            <a:r>
               <a:rPr lang="zh-TW" altLang="en-US" dirty="0"/>
               <a:t>今天來跟大家進行簡單的自我介紹</a:t>
             </a:r>
@@ -613,6 +622,31 @@
           <a:lstStyle/>
           <a:p>
             <a:r>
+              <a:rPr lang="en-US" altLang="zh-TW" sz="1800" b="0" i="0" u="none" strike="noStrike" baseline="0" dirty="0">
+                <a:solidFill>
+                  <a:srgbClr val="000000"/>
+                </a:solidFill>
+                <a:latin typeface="標楷體" panose="03000509000000000000" pitchFamily="65" charset="-120"/>
+                <a:ea typeface="標楷體" panose="03000509000000000000" pitchFamily="65" charset="-120"/>
+              </a:rPr>
+              <a:t>Prompt: </a:t>
+            </a:r>
+            <a:r>
+              <a:rPr lang="en-US" altLang="zh-TW" sz="2800" dirty="0"/>
+              <a:t>An anime-style young male scientist stands confidently in a bright, modern laboratory. He has short, light-colored hair and wears a white lab coat over a brown vest and tie, giving him a professional yet approachable appearance. The laboratory is spacious, filled with clean, white cabinets, shelves, and lab equipment like flasks and test tubes. Large windows on the left allow natural light to flood the room, while bright overhead lights create a well-lit working environment. The overall mood is one of calm focus and precision, with a sense of advanced research taking place.</a:t>
+            </a:r>
+          </a:p>
+          <a:p>
+            <a:endParaRPr lang="en-US" altLang="zh-TW" sz="1800" b="0" i="0" u="none" strike="noStrike" baseline="0" dirty="0">
+              <a:solidFill>
+                <a:srgbClr val="000000"/>
+              </a:solidFill>
+              <a:latin typeface="標楷體" panose="03000509000000000000" pitchFamily="65" charset="-120"/>
+              <a:ea typeface="標楷體" panose="03000509000000000000" pitchFamily="65" charset="-120"/>
+            </a:endParaRPr>
+          </a:p>
+          <a:p>
+            <a:r>
               <a:rPr lang="zh-TW" altLang="en-US" sz="1800" b="0" i="0" u="none" strike="noStrike" baseline="0" dirty="0">
                 <a:solidFill>
                   <a:srgbClr val="000000"/>
@@ -729,6 +763,31 @@
           <a:lstStyle/>
           <a:p>
             <a:r>
+              <a:rPr lang="en-US" altLang="zh-TW" sz="1800" b="0" i="0" u="none" strike="noStrike" baseline="0" dirty="0">
+                <a:solidFill>
+                  <a:srgbClr val="000000"/>
+                </a:solidFill>
+                <a:latin typeface="標楷體" panose="03000509000000000000" pitchFamily="65" charset="-120"/>
+                <a:ea typeface="標楷體" panose="03000509000000000000" pitchFamily="65" charset="-120"/>
+              </a:rPr>
+              <a:t>Prompt: </a:t>
+            </a:r>
+            <a:r>
+              <a:rPr lang="en-US" altLang="zh-TW" sz="2800" dirty="0"/>
+              <a:t>An anime-style scene set in a bustling, futuristic laboratory filled with young scientists and researchers. The main character, a young male with light gray hair, stands at the forefront with a serious or contemplative expression, arms crossed. He wears a white lab coat over a brown vest and tie, with a badge on his sleeve, suggesting his scientific role. Surrounding him are several other young researchers in lab coats, some engaged in conversation while others are working or observing. The laboratory is bright and modern, with sleek workstations, large windows letting in natural light, and advanced equipment in the background. The overall atmosphere reflects a collaborative, research-driven environment, with a mix of focus and casual interaction among the characters.</a:t>
+            </a:r>
+          </a:p>
+          <a:p>
+            <a:endParaRPr lang="en-US" altLang="zh-TW" sz="1800" b="0" i="0" u="none" strike="noStrike" baseline="0" dirty="0">
+              <a:solidFill>
+                <a:srgbClr val="000000"/>
+              </a:solidFill>
+              <a:latin typeface="標楷體" panose="03000509000000000000" pitchFamily="65" charset="-120"/>
+              <a:ea typeface="標楷體" panose="03000509000000000000" pitchFamily="65" charset="-120"/>
+            </a:endParaRPr>
+          </a:p>
+          <a:p>
+            <a:r>
               <a:rPr lang="zh-TW" altLang="en-US" sz="1800" b="0" i="0" u="none" strike="noStrike" baseline="0" dirty="0">
                 <a:solidFill>
                   <a:srgbClr val="000000"/>
@@ -825,6 +884,38 @@
           <a:lstStyle/>
           <a:p>
             <a:r>
+              <a:rPr lang="en-US" altLang="zh-TW" sz="1800" b="0" i="0" u="none" strike="noStrike" baseline="0" dirty="0">
+                <a:solidFill>
+                  <a:srgbClr val="000000"/>
+                </a:solidFill>
+                <a:latin typeface="標楷體" panose="03000509000000000000" pitchFamily="65" charset="-120"/>
+                <a:ea typeface="標楷體" panose="03000509000000000000" pitchFamily="65" charset="-120"/>
+              </a:rPr>
+              <a:t>Prompt: </a:t>
+            </a:r>
+            <a:r>
+              <a:rPr lang="en-US" altLang="zh-TW" sz="2800" dirty="0"/>
+              <a:t>An anime-style scene set in a high-tech forensic science laboratory. The main character, a young male scientist with silver-gray hair, is deeply focused on studying a large, open book with fingerprint images. He wears a white lab coat, a vest, and a tie, giving him a professional appearance. Surrounding him are various lab tools, including a microscope, beakers filled with blue liquid, and scientific instruments. In the background, a large digital screen displays forensic science data, such as a skeleton and a fingerprint, contributing to the advanced and futuristic feel of the setting. Another scientist works in the background, adding to the sense of a busy, research-focused environment. The lighting is bright and cool, with shelves full of scientific books lining the walls, creating a serious and studious atmosphere.</a:t>
+            </a:r>
+            <a:endParaRPr lang="en-US" altLang="zh-TW" sz="1800" b="0" i="0" u="none" strike="noStrike" baseline="0" dirty="0">
+              <a:solidFill>
+                <a:srgbClr val="000000"/>
+              </a:solidFill>
+              <a:latin typeface="標楷體" panose="03000509000000000000" pitchFamily="65" charset="-120"/>
+              <a:ea typeface="標楷體" panose="03000509000000000000" pitchFamily="65" charset="-120"/>
+            </a:endParaRPr>
+          </a:p>
+          <a:p>
+            <a:endParaRPr lang="en-US" altLang="zh-TW" sz="1800" b="0" i="0" u="none" strike="noStrike" baseline="0" dirty="0">
+              <a:solidFill>
+                <a:srgbClr val="000000"/>
+              </a:solidFill>
+              <a:latin typeface="標楷體" panose="03000509000000000000" pitchFamily="65" charset="-120"/>
+              <a:ea typeface="標楷體" panose="03000509000000000000" pitchFamily="65" charset="-120"/>
+            </a:endParaRPr>
+          </a:p>
+          <a:p>
+            <a:r>
               <a:rPr lang="zh-TW" altLang="en-US" sz="1800" b="0" i="0" u="none" strike="noStrike" baseline="0" dirty="0">
                 <a:solidFill>
                   <a:srgbClr val="000000"/>
@@ -919,6 +1010,31 @@
           <a:lstStyle/>
           <a:p>
             <a:r>
+              <a:rPr lang="en-US" altLang="zh-TW" sz="1800" b="0" i="0" u="none" strike="noStrike" baseline="0" dirty="0">
+                <a:solidFill>
+                  <a:srgbClr val="000000"/>
+                </a:solidFill>
+                <a:latin typeface="標楷體" panose="03000509000000000000" pitchFamily="65" charset="-120"/>
+                <a:ea typeface="標楷體" panose="03000509000000000000" pitchFamily="65" charset="-120"/>
+              </a:rPr>
+              <a:t>Prompt: </a:t>
+            </a:r>
+            <a:r>
+              <a:rPr lang="en-US" altLang="zh-TW" sz="2800" dirty="0"/>
+              <a:t>An anime-style scene featuring a young male scientist in a moment of panic inside a high-tech forensic laboratory. The character, with silver-gray hair and wearing a lab coat, is holding his head in distress as sparks fly from a malfunctioning machine in front of him. The device displays warning messages like 'Breakdown' and 'Error,' heightening the sense of urgency. Surrounding the character are various laboratory tools, including a microscope, flasks, and test tubes with blue liquid. Digital forensic displays in the background show detailed images of fingerprints and a facial profile, emphasizing the forensic science theme. The lighting is dramatic, with overhead lab lights shining on the chaotic scene, adding to the intense atmosphere of technological failure and the character's frustration.</a:t>
+            </a:r>
+          </a:p>
+          <a:p>
+            <a:endParaRPr lang="en-US" altLang="zh-TW" sz="1800" b="0" i="0" u="none" strike="noStrike" baseline="0" dirty="0">
+              <a:solidFill>
+                <a:srgbClr val="000000"/>
+              </a:solidFill>
+              <a:latin typeface="標楷體" panose="03000509000000000000" pitchFamily="65" charset="-120"/>
+              <a:ea typeface="標楷體" panose="03000509000000000000" pitchFamily="65" charset="-120"/>
+            </a:endParaRPr>
+          </a:p>
+          <a:p>
+            <a:r>
               <a:rPr lang="zh-TW" altLang="en-US" sz="1800" b="0" i="0" u="none" strike="noStrike" baseline="0" dirty="0">
                 <a:solidFill>
                   <a:srgbClr val="000000"/>
@@ -1035,6 +1151,38 @@
           <a:lstStyle/>
           <a:p>
             <a:r>
+              <a:rPr lang="en-US" altLang="zh-TW" sz="1800" b="0" i="0" u="none" strike="noStrike" baseline="0" dirty="0">
+                <a:solidFill>
+                  <a:srgbClr val="000000"/>
+                </a:solidFill>
+                <a:latin typeface="標楷體" panose="03000509000000000000" pitchFamily="65" charset="-120"/>
+                <a:ea typeface="標楷體" panose="03000509000000000000" pitchFamily="65" charset="-120"/>
+              </a:rPr>
+              <a:t>Prompt: </a:t>
+            </a:r>
+            <a:r>
+              <a:rPr lang="en-US" altLang="zh-TW" sz="2800" dirty="0"/>
+              <a:t>An anime-style scene set in a calm and professional science laboratory, featuring a warm interaction between a young male scientist and an older mentor figure. The younger character, seated at a lab desk with a microscope and research papers, has silver-gray hair and is dressed in a lab coat over a brown vest and tie. He looks up with admiration at the older man, who stands beside him with a gentle smile, placing a reassuring hand on the younger one's shoulder. The mentor, also dressed in a white lab coat with a tie, has gray hair and a warm, encouraging expression. In the background, other researchers are quietly working, and the room is filled with scientific equipment, charts, and beakers with blue liquid. The scene conveys a sense of mentorship, support, and collaboration in a peaceful academic environment.</a:t>
+            </a:r>
+            <a:endParaRPr lang="en-US" altLang="zh-TW" sz="1800" b="0" i="0" u="none" strike="noStrike" baseline="0" dirty="0">
+              <a:solidFill>
+                <a:srgbClr val="000000"/>
+              </a:solidFill>
+              <a:latin typeface="標楷體" panose="03000509000000000000" pitchFamily="65" charset="-120"/>
+              <a:ea typeface="標楷體" panose="03000509000000000000" pitchFamily="65" charset="-120"/>
+            </a:endParaRPr>
+          </a:p>
+          <a:p>
+            <a:endParaRPr lang="en-US" altLang="zh-TW" sz="1800" b="0" i="0" u="none" strike="noStrike" baseline="0" dirty="0">
+              <a:solidFill>
+                <a:srgbClr val="000000"/>
+              </a:solidFill>
+              <a:latin typeface="標楷體" panose="03000509000000000000" pitchFamily="65" charset="-120"/>
+              <a:ea typeface="標楷體" panose="03000509000000000000" pitchFamily="65" charset="-120"/>
+            </a:endParaRPr>
+          </a:p>
+          <a:p>
+            <a:r>
               <a:rPr lang="zh-TW" altLang="en-US" sz="1800" b="0" i="0" u="none" strike="noStrike" baseline="0" dirty="0">
                 <a:solidFill>
                   <a:srgbClr val="000000"/>
@@ -1177,6 +1325,72 @@
               <a:defRPr/>
             </a:pPr>
             <a:r>
+              <a:rPr lang="en-US" altLang="zh-TW" sz="1800" b="0" i="0" u="none" strike="noStrike" baseline="0" dirty="0">
+                <a:solidFill>
+                  <a:srgbClr val="000000"/>
+                </a:solidFill>
+                <a:latin typeface="標楷體" panose="03000509000000000000" pitchFamily="65" charset="-120"/>
+                <a:ea typeface="標楷體" panose="03000509000000000000" pitchFamily="65" charset="-120"/>
+              </a:rPr>
+              <a:t>Prompt: </a:t>
+            </a:r>
+            <a:r>
+              <a:rPr lang="en-US" altLang="zh-TW" sz="2800" dirty="0"/>
+              <a:t>An anime-style scene in a formal forensic research presentation. A young male scientist with silver-gray hair stands at the center, holding a paper as he presents findings to a group of attentive colleagues. He is dressed in a white lab coat over a brown vest and tie, exuding professionalism. The audience, also wearing lab coats, listens carefully, with expressions of focus and interest. Behind the presenter, a large digital screen displays forensic research data, including images of a skeleton, fingerprints, and various scientific charts. The setting is a well-lit conference room or classroom, with a clock on the wall and shelves of books in the background. The atmosphere is serious and academic, with the young scientist confidently leading the discussion in front of his peers and seniors.</a:t>
+            </a:r>
+            <a:endParaRPr lang="en-US" altLang="zh-TW" sz="1800" b="0" i="0" u="none" strike="noStrike" baseline="0" dirty="0">
+              <a:solidFill>
+                <a:srgbClr val="000000"/>
+              </a:solidFill>
+              <a:latin typeface="標楷體" panose="03000509000000000000" pitchFamily="65" charset="-120"/>
+              <a:ea typeface="標楷體" panose="03000509000000000000" pitchFamily="65" charset="-120"/>
+            </a:endParaRPr>
+          </a:p>
+          <a:p>
+            <a:pPr marL="0" marR="0" lvl="0" indent="0" algn="l" defTabSz="914400" rtl="0" eaLnBrk="1" fontAlgn="auto" latinLnBrk="0" hangingPunct="1">
+              <a:lnSpc>
+                <a:spcPct val="100000"/>
+              </a:lnSpc>
+              <a:spcBef>
+                <a:spcPts val="0"/>
+              </a:spcBef>
+              <a:spcAft>
+                <a:spcPts val="0"/>
+              </a:spcAft>
+              <a:buClrTx/>
+              <a:buSzTx/>
+              <a:buFontTx/>
+              <a:buNone/>
+              <a:tabLst/>
+              <a:defRPr/>
+            </a:pPr>
+            <a:endParaRPr lang="en-US" altLang="zh-TW" sz="1800" b="0" i="0" u="none" strike="noStrike" baseline="0" dirty="0">
+              <a:solidFill>
+                <a:srgbClr val="000000"/>
+              </a:solidFill>
+              <a:latin typeface="標楷體" panose="03000509000000000000" pitchFamily="65" charset="-120"/>
+              <a:ea typeface="標楷體" panose="03000509000000000000" pitchFamily="65" charset="-120"/>
+            </a:endParaRPr>
+          </a:p>
+          <a:p>
+            <a:pPr marL="0" marR="0" lvl="0" indent="0" algn="l" defTabSz="914400" rtl="0" eaLnBrk="1" fontAlgn="auto" latinLnBrk="0" hangingPunct="1">
+              <a:lnSpc>
+                <a:spcPct val="100000"/>
+              </a:lnSpc>
+              <a:spcBef>
+                <a:spcPts val="0"/>
+              </a:spcBef>
+              <a:spcAft>
+                <a:spcPts val="0"/>
+              </a:spcAft>
+              <a:buClrTx/>
+              <a:buSzTx/>
+              <a:buFontTx/>
+              <a:buNone/>
+              <a:tabLst/>
+              <a:defRPr/>
+            </a:pPr>
+            <a:r>
               <a:rPr lang="zh-TW" altLang="en-US" sz="1800" b="0" i="0" u="none" strike="noStrike" baseline="0" dirty="0">
                 <a:solidFill>
                   <a:srgbClr val="000000"/>
@@ -1268,6 +1482,15 @@
         <p:txBody>
           <a:bodyPr/>
           <a:lstStyle/>
+          <a:p>
+            <a:r>
+              <a:rPr lang="en-US" altLang="zh-TW" dirty="0"/>
+              <a:t>Prompt: An anime-style scene set in a grand, well-lit laboratory with tall, arched windows that allow golden sunlight to stream into the room. The central character, a young male scientist with silver hair, stands confidently at the center, illuminated by the radiant sunlight behind him, creating a halo effect. He wears a white lab coat over a vest and tie, and smiles warmly, exuding leadership and optimism. Surrounding him are several other researchers, both male and female, also dressed in lab coats. They are positioned casually around the lab, some holding flasks with blue liquid, while others engage in quiet conversation. The scene captures a moment of camaraderie and success in a bright, inspiring environment, with the golden rays of sunlight symbolizing achievement and hope.</a:t>
+            </a:r>
+          </a:p>
+          <a:p>
+            <a:endParaRPr lang="en-US" altLang="zh-TW" dirty="0"/>
+          </a:p>
           <a:p>
             <a:r>
               <a:rPr lang="zh-TW" altLang="en-US" dirty="0"/>
@@ -1459,7 +1682,7 @@
           <a:p>
             <a:fld id="{C3C90D7E-32D6-4894-AE08-7BBB3E610FC9}" type="datetimeFigureOut">
               <a:rPr lang="zh-TW" altLang="en-US" smtClean="0"/>
-              <a:t>2024/10/22</a:t>
+              <a:t>2024/10/23</a:t>
             </a:fld>
             <a:endParaRPr lang="zh-TW" altLang="en-US"/>
           </a:p>
@@ -1657,7 +1880,7 @@
           <a:p>
             <a:fld id="{C3C90D7E-32D6-4894-AE08-7BBB3E610FC9}" type="datetimeFigureOut">
               <a:rPr lang="zh-TW" altLang="en-US" smtClean="0"/>
-              <a:t>2024/10/22</a:t>
+              <a:t>2024/10/23</a:t>
             </a:fld>
             <a:endParaRPr lang="zh-TW" altLang="en-US"/>
           </a:p>
@@ -1865,7 +2088,7 @@
           <a:p>
             <a:fld id="{C3C90D7E-32D6-4894-AE08-7BBB3E610FC9}" type="datetimeFigureOut">
               <a:rPr lang="zh-TW" altLang="en-US" smtClean="0"/>
-              <a:t>2024/10/22</a:t>
+              <a:t>2024/10/23</a:t>
             </a:fld>
             <a:endParaRPr lang="zh-TW" altLang="en-US"/>
           </a:p>
@@ -2063,7 +2286,7 @@
           <a:p>
             <a:fld id="{C3C90D7E-32D6-4894-AE08-7BBB3E610FC9}" type="datetimeFigureOut">
               <a:rPr lang="zh-TW" altLang="en-US" smtClean="0"/>
-              <a:t>2024/10/22</a:t>
+              <a:t>2024/10/23</a:t>
             </a:fld>
             <a:endParaRPr lang="zh-TW" altLang="en-US"/>
           </a:p>
@@ -2338,7 +2561,7 @@
           <a:p>
             <a:fld id="{C3C90D7E-32D6-4894-AE08-7BBB3E610FC9}" type="datetimeFigureOut">
               <a:rPr lang="zh-TW" altLang="en-US" smtClean="0"/>
-              <a:t>2024/10/22</a:t>
+              <a:t>2024/10/23</a:t>
             </a:fld>
             <a:endParaRPr lang="zh-TW" altLang="en-US"/>
           </a:p>
@@ -2603,7 +2826,7 @@
           <a:p>
             <a:fld id="{C3C90D7E-32D6-4894-AE08-7BBB3E610FC9}" type="datetimeFigureOut">
               <a:rPr lang="zh-TW" altLang="en-US" smtClean="0"/>
-              <a:t>2024/10/22</a:t>
+              <a:t>2024/10/23</a:t>
             </a:fld>
             <a:endParaRPr lang="zh-TW" altLang="en-US"/>
           </a:p>
@@ -3015,7 +3238,7 @@
           <a:p>
             <a:fld id="{C3C90D7E-32D6-4894-AE08-7BBB3E610FC9}" type="datetimeFigureOut">
               <a:rPr lang="zh-TW" altLang="en-US" smtClean="0"/>
-              <a:t>2024/10/22</a:t>
+              <a:t>2024/10/23</a:t>
             </a:fld>
             <a:endParaRPr lang="zh-TW" altLang="en-US"/>
           </a:p>
@@ -3156,7 +3379,7 @@
           <a:p>
             <a:fld id="{C3C90D7E-32D6-4894-AE08-7BBB3E610FC9}" type="datetimeFigureOut">
               <a:rPr lang="zh-TW" altLang="en-US" smtClean="0"/>
-              <a:t>2024/10/22</a:t>
+              <a:t>2024/10/23</a:t>
             </a:fld>
             <a:endParaRPr lang="zh-TW" altLang="en-US"/>
           </a:p>
@@ -3269,7 +3492,7 @@
           <a:p>
             <a:fld id="{C3C90D7E-32D6-4894-AE08-7BBB3E610FC9}" type="datetimeFigureOut">
               <a:rPr lang="zh-TW" altLang="en-US" smtClean="0"/>
-              <a:t>2024/10/22</a:t>
+              <a:t>2024/10/23</a:t>
             </a:fld>
             <a:endParaRPr lang="zh-TW" altLang="en-US"/>
           </a:p>
@@ -3580,7 +3803,7 @@
           <a:p>
             <a:fld id="{C3C90D7E-32D6-4894-AE08-7BBB3E610FC9}" type="datetimeFigureOut">
               <a:rPr lang="zh-TW" altLang="en-US" smtClean="0"/>
-              <a:t>2024/10/22</a:t>
+              <a:t>2024/10/23</a:t>
             </a:fld>
             <a:endParaRPr lang="zh-TW" altLang="en-US"/>
           </a:p>
@@ -3868,7 +4091,7 @@
           <a:p>
             <a:fld id="{C3C90D7E-32D6-4894-AE08-7BBB3E610FC9}" type="datetimeFigureOut">
               <a:rPr lang="zh-TW" altLang="en-US" smtClean="0"/>
-              <a:t>2024/10/22</a:t>
+              <a:t>2024/10/23</a:t>
             </a:fld>
             <a:endParaRPr lang="zh-TW" altLang="en-US"/>
           </a:p>
@@ -4109,7 +4332,7 @@
           <a:p>
             <a:fld id="{C3C90D7E-32D6-4894-AE08-7BBB3E610FC9}" type="datetimeFigureOut">
               <a:rPr lang="zh-TW" altLang="en-US" smtClean="0"/>
-              <a:t>2024/10/22</a:t>
+              <a:t>2024/10/23</a:t>
             </a:fld>
             <a:endParaRPr lang="zh-TW" altLang="en-US"/>
           </a:p>

</xml_diff>

<commit_message>
Edit todo on hw01.pptx
</commit_message>
<xml_diff>
--- a/hw01.pptx
+++ b/hw01.pptx
@@ -527,11 +527,23 @@
           <a:p>
             <a:r>
               <a:rPr lang="en-US" altLang="zh-TW" dirty="0"/>
-              <a:t>Prompt: A modern, minimalist interior scene with a large futuristic digital display on the wall. The display features abstract geometric shapes, circles, and thin lines, resembling a high-tech interface or data visualization. The room is sleek, with clean white walls and subtle vertical ridges on either side of the display. Two small white potted plants with delicate, minimalistic branches are placed symmetrically on both sides of the display. The setting has a calm, futuristic atmosphere with soft lighting that enhances the smooth textures and sharp lines, giving the space a clean, high-tech feel.</a:t>
+              <a:t>【Prompt】</a:t>
+            </a:r>
+          </a:p>
+          <a:p>
+            <a:r>
+              <a:rPr lang="en-US" altLang="zh-TW" dirty="0"/>
+              <a:t>A modern, minimalist interior scene with a large futuristic digital display on the wall. The display features abstract geometric shapes, circles, and thin lines, resembling a high-tech interface or data visualization. The room is sleek, with clean white walls and subtle vertical ridges on either side of the display. Two small white potted plants with delicate, minimalistic branches are placed symmetrically on both sides of the display. The setting has a calm, futuristic atmosphere with soft lighting that enhances the smooth textures and sharp lines, giving the space a clean, high-tech feel.</a:t>
             </a:r>
           </a:p>
           <a:p>
             <a:endParaRPr lang="en-US" altLang="zh-TW" dirty="0"/>
+          </a:p>
+          <a:p>
+            <a:r>
+              <a:rPr lang="en-US" altLang="zh-TW" dirty="0"/>
+              <a:t>【Context】</a:t>
+            </a:r>
           </a:p>
           <a:p>
             <a:r>
@@ -629,8 +641,10 @@
                 <a:latin typeface="標楷體" panose="03000509000000000000" pitchFamily="65" charset="-120"/>
                 <a:ea typeface="標楷體" panose="03000509000000000000" pitchFamily="65" charset="-120"/>
               </a:rPr>
-              <a:t>Prompt: </a:t>
-            </a:r>
+              <a:t>【Prompt】</a:t>
+            </a:r>
+          </a:p>
+          <a:p>
             <a:r>
               <a:rPr lang="en-US" altLang="zh-TW" sz="2800" dirty="0"/>
               <a:t>An anime-style young male scientist stands confidently in a bright, modern laboratory. He has short, light-colored hair and wears a white lab coat over a brown vest and tie, giving him a professional yet approachable appearance. The laboratory is spacious, filled with clean, white cabinets, shelves, and lab equipment like flasks and test tubes. Large windows on the left allow natural light to flood the room, while bright overhead lights create a well-lit working environment. The overall mood is one of calm focus and precision, with a sense of advanced research taking place.</a:t>
@@ -644,6 +658,18 @@
               <a:latin typeface="標楷體" panose="03000509000000000000" pitchFamily="65" charset="-120"/>
               <a:ea typeface="標楷體" panose="03000509000000000000" pitchFamily="65" charset="-120"/>
             </a:endParaRPr>
+          </a:p>
+          <a:p>
+            <a:r>
+              <a:rPr lang="en-US" altLang="zh-TW" sz="1800" b="0" i="0" u="none" strike="noStrike" baseline="0" dirty="0">
+                <a:solidFill>
+                  <a:srgbClr val="000000"/>
+                </a:solidFill>
+                <a:latin typeface="標楷體" panose="03000509000000000000" pitchFamily="65" charset="-120"/>
+                <a:ea typeface="標楷體" panose="03000509000000000000" pitchFamily="65" charset="-120"/>
+              </a:rPr>
+              <a:t>【Context】</a:t>
+            </a:r>
           </a:p>
           <a:p>
             <a:r>
@@ -770,8 +796,10 @@
                 <a:latin typeface="標楷體" panose="03000509000000000000" pitchFamily="65" charset="-120"/>
                 <a:ea typeface="標楷體" panose="03000509000000000000" pitchFamily="65" charset="-120"/>
               </a:rPr>
-              <a:t>Prompt: </a:t>
-            </a:r>
+              <a:t>【Prompt】</a:t>
+            </a:r>
+          </a:p>
+          <a:p>
             <a:r>
               <a:rPr lang="en-US" altLang="zh-TW" sz="2800" dirty="0"/>
               <a:t>An anime-style scene set in a bustling, futuristic laboratory filled with young scientists and researchers. The main character, a young male with light gray hair, stands at the forefront with a serious or contemplative expression, arms crossed. He wears a white lab coat over a brown vest and tie, with a badge on his sleeve, suggesting his scientific role. Surrounding him are several other young researchers in lab coats, some engaged in conversation while others are working or observing. The laboratory is bright and modern, with sleek workstations, large windows letting in natural light, and advanced equipment in the background. The overall atmosphere reflects a collaborative, research-driven environment, with a mix of focus and casual interaction among the characters.</a:t>
@@ -785,6 +813,18 @@
               <a:latin typeface="標楷體" panose="03000509000000000000" pitchFamily="65" charset="-120"/>
               <a:ea typeface="標楷體" panose="03000509000000000000" pitchFamily="65" charset="-120"/>
             </a:endParaRPr>
+          </a:p>
+          <a:p>
+            <a:r>
+              <a:rPr lang="en-US" altLang="zh-TW" sz="1800" b="0" i="0" u="none" strike="noStrike" baseline="0" dirty="0">
+                <a:solidFill>
+                  <a:srgbClr val="000000"/>
+                </a:solidFill>
+                <a:latin typeface="標楷體" panose="03000509000000000000" pitchFamily="65" charset="-120"/>
+                <a:ea typeface="標楷體" panose="03000509000000000000" pitchFamily="65" charset="-120"/>
+              </a:rPr>
+              <a:t>【Context】</a:t>
+            </a:r>
           </a:p>
           <a:p>
             <a:r>
@@ -891,8 +931,10 @@
                 <a:latin typeface="標楷體" panose="03000509000000000000" pitchFamily="65" charset="-120"/>
                 <a:ea typeface="標楷體" panose="03000509000000000000" pitchFamily="65" charset="-120"/>
               </a:rPr>
-              <a:t>Prompt: </a:t>
-            </a:r>
+              <a:t>【Prompt】</a:t>
+            </a:r>
+          </a:p>
+          <a:p>
             <a:r>
               <a:rPr lang="en-US" altLang="zh-TW" sz="2800" dirty="0"/>
               <a:t>An anime-style scene set in a high-tech forensic science laboratory. The main character, a young male scientist with silver-gray hair, is deeply focused on studying a large, open book with fingerprint images. He wears a white lab coat, a vest, and a tie, giving him a professional appearance. Surrounding him are various lab tools, including a microscope, beakers filled with blue liquid, and scientific instruments. In the background, a large digital screen displays forensic science data, such as a skeleton and a fingerprint, contributing to the advanced and futuristic feel of the setting. Another scientist works in the background, adding to the sense of a busy, research-focused environment. The lighting is bright and cool, with shelves full of scientific books lining the walls, creating a serious and studious atmosphere.</a:t>
@@ -913,6 +955,18 @@
               <a:latin typeface="標楷體" panose="03000509000000000000" pitchFamily="65" charset="-120"/>
               <a:ea typeface="標楷體" panose="03000509000000000000" pitchFamily="65" charset="-120"/>
             </a:endParaRPr>
+          </a:p>
+          <a:p>
+            <a:r>
+              <a:rPr lang="en-US" altLang="zh-TW" sz="1800" b="0" i="0" u="none" strike="noStrike" baseline="0" dirty="0">
+                <a:solidFill>
+                  <a:srgbClr val="000000"/>
+                </a:solidFill>
+                <a:latin typeface="標楷體" panose="03000509000000000000" pitchFamily="65" charset="-120"/>
+                <a:ea typeface="標楷體" panose="03000509000000000000" pitchFamily="65" charset="-120"/>
+              </a:rPr>
+              <a:t>【Context】</a:t>
+            </a:r>
           </a:p>
           <a:p>
             <a:r>
@@ -1017,8 +1071,10 @@
                 <a:latin typeface="標楷體" panose="03000509000000000000" pitchFamily="65" charset="-120"/>
                 <a:ea typeface="標楷體" panose="03000509000000000000" pitchFamily="65" charset="-120"/>
               </a:rPr>
-              <a:t>Prompt: </a:t>
-            </a:r>
+              <a:t>【Prompt】</a:t>
+            </a:r>
+          </a:p>
+          <a:p>
             <a:r>
               <a:rPr lang="en-US" altLang="zh-TW" sz="2800" dirty="0"/>
               <a:t>An anime-style scene featuring a young male scientist in a moment of panic inside a high-tech forensic laboratory. The character, with silver-gray hair and wearing a lab coat, is holding his head in distress as sparks fly from a malfunctioning machine in front of him. The device displays warning messages like 'Breakdown' and 'Error,' heightening the sense of urgency. Surrounding the character are various laboratory tools, including a microscope, flasks, and test tubes with blue liquid. Digital forensic displays in the background show detailed images of fingerprints and a facial profile, emphasizing the forensic science theme. The lighting is dramatic, with overhead lab lights shining on the chaotic scene, adding to the intense atmosphere of technological failure and the character's frustration.</a:t>
@@ -1032,6 +1088,18 @@
               <a:latin typeface="標楷體" panose="03000509000000000000" pitchFamily="65" charset="-120"/>
               <a:ea typeface="標楷體" panose="03000509000000000000" pitchFamily="65" charset="-120"/>
             </a:endParaRPr>
+          </a:p>
+          <a:p>
+            <a:r>
+              <a:rPr lang="en-US" altLang="zh-TW" sz="1800" b="0" i="0" u="none" strike="noStrike" baseline="0" dirty="0">
+                <a:solidFill>
+                  <a:srgbClr val="000000"/>
+                </a:solidFill>
+                <a:latin typeface="標楷體" panose="03000509000000000000" pitchFamily="65" charset="-120"/>
+                <a:ea typeface="標楷體" panose="03000509000000000000" pitchFamily="65" charset="-120"/>
+              </a:rPr>
+              <a:t>【Context】</a:t>
+            </a:r>
           </a:p>
           <a:p>
             <a:r>
@@ -1158,8 +1226,10 @@
                 <a:latin typeface="標楷體" panose="03000509000000000000" pitchFamily="65" charset="-120"/>
                 <a:ea typeface="標楷體" panose="03000509000000000000" pitchFamily="65" charset="-120"/>
               </a:rPr>
-              <a:t>Prompt: </a:t>
-            </a:r>
+              <a:t>【Prompt】</a:t>
+            </a:r>
+          </a:p>
+          <a:p>
             <a:r>
               <a:rPr lang="en-US" altLang="zh-TW" sz="2800" dirty="0"/>
               <a:t>An anime-style scene set in a calm and professional science laboratory, featuring a warm interaction between a young male scientist and an older mentor figure. The younger character, seated at a lab desk with a microscope and research papers, has silver-gray hair and is dressed in a lab coat over a brown vest and tie. He looks up with admiration at the older man, who stands beside him with a gentle smile, placing a reassuring hand on the younger one's shoulder. The mentor, also dressed in a white lab coat with a tie, has gray hair and a warm, encouraging expression. In the background, other researchers are quietly working, and the room is filled with scientific equipment, charts, and beakers with blue liquid. The scene conveys a sense of mentorship, support, and collaboration in a peaceful academic environment.</a:t>
@@ -1180,6 +1250,18 @@
               <a:latin typeface="標楷體" panose="03000509000000000000" pitchFamily="65" charset="-120"/>
               <a:ea typeface="標楷體" panose="03000509000000000000" pitchFamily="65" charset="-120"/>
             </a:endParaRPr>
+          </a:p>
+          <a:p>
+            <a:r>
+              <a:rPr lang="en-US" altLang="zh-TW" sz="1800" b="0" i="0" u="none" strike="noStrike" baseline="0" dirty="0">
+                <a:solidFill>
+                  <a:srgbClr val="000000"/>
+                </a:solidFill>
+                <a:latin typeface="標楷體" panose="03000509000000000000" pitchFamily="65" charset="-120"/>
+                <a:ea typeface="標楷體" panose="03000509000000000000" pitchFamily="65" charset="-120"/>
+              </a:rPr>
+              <a:t>【Context】</a:t>
+            </a:r>
           </a:p>
           <a:p>
             <a:r>
@@ -1332,8 +1414,27 @@
                 <a:latin typeface="標楷體" panose="03000509000000000000" pitchFamily="65" charset="-120"/>
                 <a:ea typeface="標楷體" panose="03000509000000000000" pitchFamily="65" charset="-120"/>
               </a:rPr>
-              <a:t>Prompt: </a:t>
-            </a:r>
+              <a:t>【Prompt】</a:t>
+            </a:r>
+          </a:p>
+          <a:p>
+            <a:pPr marL="0" marR="0" lvl="0" indent="0" algn="l" defTabSz="914400" rtl="0" eaLnBrk="1" fontAlgn="auto" latinLnBrk="0" hangingPunct="1">
+              <a:lnSpc>
+                <a:spcPct val="100000"/>
+              </a:lnSpc>
+              <a:spcBef>
+                <a:spcPts val="0"/>
+              </a:spcBef>
+              <a:spcAft>
+                <a:spcPts val="0"/>
+              </a:spcAft>
+              <a:buClrTx/>
+              <a:buSzTx/>
+              <a:buFontTx/>
+              <a:buNone/>
+              <a:tabLst/>
+              <a:defRPr/>
+            </a:pPr>
             <a:r>
               <a:rPr lang="en-US" altLang="zh-TW" sz="2800" dirty="0"/>
               <a:t>An anime-style scene in a formal forensic research presentation. A young male scientist with silver-gray hair stands at the center, holding a paper as he presents findings to a group of attentive colleagues. He is dressed in a white lab coat over a brown vest and tie, exuding professionalism. The audience, also wearing lab coats, listens carefully, with expressions of focus and interest. Behind the presenter, a large digital screen displays forensic research data, including images of a skeleton, fingerprints, and various scientific charts. The setting is a well-lit conference room or classroom, with a clock on the wall and shelves of books in the background. The atmosphere is serious and academic, with the young scientist confidently leading the discussion in front of his peers and seniors.</a:t>
@@ -1371,6 +1472,35 @@
               <a:latin typeface="標楷體" panose="03000509000000000000" pitchFamily="65" charset="-120"/>
               <a:ea typeface="標楷體" panose="03000509000000000000" pitchFamily="65" charset="-120"/>
             </a:endParaRPr>
+          </a:p>
+          <a:p>
+            <a:pPr marL="0" marR="0" lvl="0" indent="0" algn="l" defTabSz="914400" rtl="0" eaLnBrk="1" fontAlgn="auto" latinLnBrk="0" hangingPunct="1">
+              <a:lnSpc>
+                <a:spcPct val="100000"/>
+              </a:lnSpc>
+              <a:spcBef>
+                <a:spcPts val="0"/>
+              </a:spcBef>
+              <a:spcAft>
+                <a:spcPts val="0"/>
+              </a:spcAft>
+              <a:buClrTx/>
+              <a:buSzTx/>
+              <a:buFontTx/>
+              <a:buNone/>
+              <a:tabLst/>
+              <a:defRPr/>
+            </a:pPr>
+            <a:r>
+              <a:rPr lang="en-US" altLang="zh-TW" sz="1800" b="0" i="0" u="none" strike="noStrike" baseline="0" dirty="0">
+                <a:solidFill>
+                  <a:srgbClr val="000000"/>
+                </a:solidFill>
+                <a:latin typeface="標楷體" panose="03000509000000000000" pitchFamily="65" charset="-120"/>
+                <a:ea typeface="標楷體" panose="03000509000000000000" pitchFamily="65" charset="-120"/>
+              </a:rPr>
+              <a:t>【Context】</a:t>
+            </a:r>
           </a:p>
           <a:p>
             <a:pPr marL="0" marR="0" lvl="0" indent="0" algn="l" defTabSz="914400" rtl="0" eaLnBrk="1" fontAlgn="auto" latinLnBrk="0" hangingPunct="1">
@@ -1485,10 +1615,23 @@
           <a:p>
             <a:r>
               <a:rPr lang="en-US" altLang="zh-TW" dirty="0"/>
-              <a:t>Prompt: An anime-style scene set in a grand, well-lit laboratory with tall, arched windows that allow golden sunlight to stream into the room. The central character, a young male scientist with silver hair, stands confidently at the center, illuminated by the radiant sunlight behind him, creating a halo effect. He wears a white lab coat over a vest and tie, and smiles warmly, exuding leadership and optimism. Surrounding him are several other researchers, both male and female, also dressed in lab coats. They are positioned casually around the lab, some holding flasks with blue liquid, while others engage in quiet conversation. The scene captures a moment of camaraderie and success in a bright, inspiring environment, with the golden rays of sunlight symbolizing achievement and hope.</a:t>
-            </a:r>
-          </a:p>
-          <a:p>
+              <a:t>【Prompt】</a:t>
+            </a:r>
+          </a:p>
+          <a:p>
+            <a:r>
+              <a:rPr lang="en-US" altLang="zh-TW" dirty="0"/>
+              <a:t>An anime-style scene set in a grand, well-lit laboratory with tall, arched windows that allow golden sunlight to stream into the room. The central character, a young male scientist with silver hair, stands confidently at the center, illuminated by the radiant sunlight behind him, creating a halo effect. He wears a white lab coat over a vest and tie, and smiles warmly, exuding leadership and optimism. Surrounding him are several other researchers, both male and female, also dressed in lab coats. They are positioned casually around the lab, some holding flasks with blue liquid, while others engage in quiet conversation. The scene captures a moment of camaraderie and success in a bright, inspiring environment, with the golden rays of sunlight symbolizing achievement and hope.</a:t>
+            </a:r>
+          </a:p>
+          <a:p>
+            <a:endParaRPr lang="en-US" altLang="zh-TW" dirty="0"/>
+          </a:p>
+          <a:p>
+            <a:r>
+              <a:rPr lang="en-US" altLang="zh-TW"/>
+              <a:t>【Context】</a:t>
+            </a:r>
             <a:endParaRPr lang="en-US" altLang="zh-TW" dirty="0"/>
           </a:p>
           <a:p>

</xml_diff>